<commit_message>
Final version of smart contract and tests, now using Hardhat
</commit_message>
<xml_diff>
--- a/presentations/assignment.pptx
+++ b/presentations/assignment.pptx
@@ -792,7 +792,7 @@
           <a:p>
             <a:fld id="{EF9AD6F8-A591-C44C-9482-E4B047C3EFEA}" type="datetimeFigureOut">
               <a:rPr lang="en-BR" smtClean="0"/>
-              <a:t>04/11/23</a:t>
+              <a:t>17/02/24</a:t>
             </a:fld>
             <a:endParaRPr lang="en-BR"/>
           </a:p>
@@ -1209,7 +1209,7 @@
           <a:p>
             <a:fld id="{467D39E7-486C-464B-BF16-68AD985C302D}" type="datetimeFigureOut">
               <a:rPr lang="en-BR" smtClean="0"/>
-              <a:t>04/11/23</a:t>
+              <a:t>17/02/24</a:t>
             </a:fld>
             <a:endParaRPr lang="en-BR"/>
           </a:p>
@@ -1417,7 +1417,7 @@
           <a:p>
             <a:fld id="{467D39E7-486C-464B-BF16-68AD985C302D}" type="datetimeFigureOut">
               <a:rPr lang="en-BR" smtClean="0"/>
-              <a:t>04/11/23</a:t>
+              <a:t>17/02/24</a:t>
             </a:fld>
             <a:endParaRPr lang="en-BR"/>
           </a:p>
@@ -1635,7 +1635,7 @@
           <a:p>
             <a:fld id="{467D39E7-486C-464B-BF16-68AD985C302D}" type="datetimeFigureOut">
               <a:rPr lang="en-BR" smtClean="0"/>
-              <a:t>04/11/23</a:t>
+              <a:t>17/02/24</a:t>
             </a:fld>
             <a:endParaRPr lang="en-BR"/>
           </a:p>
@@ -1847,7 +1847,7 @@
           <a:p>
             <a:fld id="{467D39E7-486C-464B-BF16-68AD985C302D}" type="datetimeFigureOut">
               <a:rPr lang="en-BR" smtClean="0"/>
-              <a:t>04/11/23</a:t>
+              <a:t>17/02/24</a:t>
             </a:fld>
             <a:endParaRPr lang="en-BR"/>
           </a:p>
@@ -2131,7 +2131,7 @@
           <a:p>
             <a:fld id="{467D39E7-486C-464B-BF16-68AD985C302D}" type="datetimeFigureOut">
               <a:rPr lang="en-BR" smtClean="0"/>
-              <a:t>04/11/23</a:t>
+              <a:t>17/02/24</a:t>
             </a:fld>
             <a:endParaRPr lang="en-BR"/>
           </a:p>
@@ -2411,7 +2411,7 @@
           <a:p>
             <a:fld id="{467D39E7-486C-464B-BF16-68AD985C302D}" type="datetimeFigureOut">
               <a:rPr lang="en-BR" smtClean="0"/>
-              <a:t>04/11/23</a:t>
+              <a:t>17/02/24</a:t>
             </a:fld>
             <a:endParaRPr lang="en-BR"/>
           </a:p>
@@ -2801,7 +2801,7 @@
           <a:p>
             <a:fld id="{467D39E7-486C-464B-BF16-68AD985C302D}" type="datetimeFigureOut">
               <a:rPr lang="en-BR" smtClean="0"/>
-              <a:t>04/11/23</a:t>
+              <a:t>17/02/24</a:t>
             </a:fld>
             <a:endParaRPr lang="en-BR"/>
           </a:p>
@@ -2951,7 +2951,7 @@
           <a:p>
             <a:fld id="{467D39E7-486C-464B-BF16-68AD985C302D}" type="datetimeFigureOut">
               <a:rPr lang="en-BR" smtClean="0"/>
-              <a:t>04/11/23</a:t>
+              <a:t>17/02/24</a:t>
             </a:fld>
             <a:endParaRPr lang="en-BR"/>
           </a:p>
@@ -3072,7 +3072,7 @@
           <a:p>
             <a:fld id="{467D39E7-486C-464B-BF16-68AD985C302D}" type="datetimeFigureOut">
               <a:rPr lang="en-BR" smtClean="0"/>
-              <a:t>04/11/23</a:t>
+              <a:t>17/02/24</a:t>
             </a:fld>
             <a:endParaRPr lang="en-BR"/>
           </a:p>
@@ -3393,7 +3393,7 @@
           <a:p>
             <a:fld id="{467D39E7-486C-464B-BF16-68AD985C302D}" type="datetimeFigureOut">
               <a:rPr lang="en-BR" smtClean="0"/>
-              <a:t>04/11/23</a:t>
+              <a:t>17/02/24</a:t>
             </a:fld>
             <a:endParaRPr lang="en-BR"/>
           </a:p>
@@ -3690,7 +3690,7 @@
           <a:p>
             <a:fld id="{467D39E7-486C-464B-BF16-68AD985C302D}" type="datetimeFigureOut">
               <a:rPr lang="en-BR" smtClean="0"/>
-              <a:t>04/11/23</a:t>
+              <a:t>17/02/24</a:t>
             </a:fld>
             <a:endParaRPr lang="en-BR"/>
           </a:p>
@@ -3941,7 +3941,7 @@
           <a:p>
             <a:fld id="{467D39E7-486C-464B-BF16-68AD985C302D}" type="datetimeFigureOut">
               <a:rPr lang="en-BR" smtClean="0"/>
-              <a:t>04/11/23</a:t>
+              <a:t>17/02/24</a:t>
             </a:fld>
             <a:endParaRPr lang="en-BR"/>
           </a:p>
@@ -4565,8 +4565,8 @@
           </a:prstGeom>
         </p:spPr>
       </p:pic>
-      <mc:AlternateContent xmlns:mc="http://schemas.openxmlformats.org/markup-compatibility/2006">
-        <mc:Choice xmlns:p14="http://schemas.microsoft.com/office/powerpoint/2010/main" Requires="p14">
+      <mc:AlternateContent xmlns:mc="http://schemas.openxmlformats.org/markup-compatibility/2006" xmlns:p14="http://schemas.microsoft.com/office/powerpoint/2010/main">
+        <mc:Choice Requires="p14">
           <p:contentPart p14:bwMode="auto" r:id="rId3">
             <p14:nvContentPartPr>
               <p14:cNvPr id="8" name="Ink 7">
@@ -4585,7 +4585,7 @@
             </p14:xfrm>
           </p:contentPart>
         </mc:Choice>
-        <mc:Fallback>
+        <mc:Fallback xmlns="">
           <p:pic>
             <p:nvPicPr>
               <p:cNvPr id="8" name="Ink 7">
@@ -4616,8 +4616,8 @@
           </p:pic>
         </mc:Fallback>
       </mc:AlternateContent>
-      <mc:AlternateContent xmlns:mc="http://schemas.openxmlformats.org/markup-compatibility/2006">
-        <mc:Choice xmlns:p14="http://schemas.microsoft.com/office/powerpoint/2010/main" Requires="p14">
+      <mc:AlternateContent xmlns:mc="http://schemas.openxmlformats.org/markup-compatibility/2006" xmlns:p14="http://schemas.microsoft.com/office/powerpoint/2010/main">
+        <mc:Choice Requires="p14">
           <p:contentPart p14:bwMode="auto" r:id="rId5">
             <p14:nvContentPartPr>
               <p14:cNvPr id="9" name="Ink 8">
@@ -4636,7 +4636,7 @@
             </p14:xfrm>
           </p:contentPart>
         </mc:Choice>
-        <mc:Fallback>
+        <mc:Fallback xmlns="">
           <p:pic>
             <p:nvPicPr>
               <p:cNvPr id="9" name="Ink 8">
@@ -4667,8 +4667,8 @@
           </p:pic>
         </mc:Fallback>
       </mc:AlternateContent>
-      <mc:AlternateContent xmlns:mc="http://schemas.openxmlformats.org/markup-compatibility/2006">
-        <mc:Choice xmlns:p14="http://schemas.microsoft.com/office/powerpoint/2010/main" Requires="p14">
+      <mc:AlternateContent xmlns:mc="http://schemas.openxmlformats.org/markup-compatibility/2006" xmlns:p14="http://schemas.microsoft.com/office/powerpoint/2010/main">
+        <mc:Choice Requires="p14">
           <p:contentPart p14:bwMode="auto" r:id="rId7">
             <p14:nvContentPartPr>
               <p14:cNvPr id="10" name="Ink 9">
@@ -4687,7 +4687,7 @@
             </p14:xfrm>
           </p:contentPart>
         </mc:Choice>
-        <mc:Fallback>
+        <mc:Fallback xmlns="">
           <p:pic>
             <p:nvPicPr>
               <p:cNvPr id="10" name="Ink 9">
@@ -4738,8 +4738,8 @@
             <a:chExt cx="282240" cy="61920"/>
           </a:xfrm>
         </p:grpSpPr>
-        <mc:AlternateContent xmlns:mc="http://schemas.openxmlformats.org/markup-compatibility/2006">
-          <mc:Choice xmlns:p14="http://schemas.microsoft.com/office/powerpoint/2010/main" Requires="p14">
+        <mc:AlternateContent xmlns:mc="http://schemas.openxmlformats.org/markup-compatibility/2006" xmlns:p14="http://schemas.microsoft.com/office/powerpoint/2010/main">
+          <mc:Choice Requires="p14">
             <p:contentPart p14:bwMode="auto" r:id="rId9">
               <p14:nvContentPartPr>
                 <p14:cNvPr id="11" name="Ink 10">
@@ -4758,7 +4758,7 @@
               </p14:xfrm>
             </p:contentPart>
           </mc:Choice>
-          <mc:Fallback>
+          <mc:Fallback xmlns="">
             <p:pic>
               <p:nvPicPr>
                 <p:cNvPr id="11" name="Ink 10">
@@ -4789,8 +4789,8 @@
             </p:pic>
           </mc:Fallback>
         </mc:AlternateContent>
-        <mc:AlternateContent xmlns:mc="http://schemas.openxmlformats.org/markup-compatibility/2006">
-          <mc:Choice xmlns:p14="http://schemas.microsoft.com/office/powerpoint/2010/main" Requires="p14">
+        <mc:AlternateContent xmlns:mc="http://schemas.openxmlformats.org/markup-compatibility/2006" xmlns:p14="http://schemas.microsoft.com/office/powerpoint/2010/main">
+          <mc:Choice Requires="p14">
             <p:contentPart p14:bwMode="auto" r:id="rId11">
               <p14:nvContentPartPr>
                 <p14:cNvPr id="12" name="Ink 11">
@@ -4809,7 +4809,7 @@
               </p14:xfrm>
             </p:contentPart>
           </mc:Choice>
-          <mc:Fallback>
+          <mc:Fallback xmlns="">
             <p:pic>
               <p:nvPicPr>
                 <p:cNvPr id="12" name="Ink 11">
@@ -4840,8 +4840,8 @@
             </p:pic>
           </mc:Fallback>
         </mc:AlternateContent>
-        <mc:AlternateContent xmlns:mc="http://schemas.openxmlformats.org/markup-compatibility/2006">
-          <mc:Choice xmlns:p14="http://schemas.microsoft.com/office/powerpoint/2010/main" Requires="p14">
+        <mc:AlternateContent xmlns:mc="http://schemas.openxmlformats.org/markup-compatibility/2006" xmlns:p14="http://schemas.microsoft.com/office/powerpoint/2010/main">
+          <mc:Choice Requires="p14">
             <p:contentPart p14:bwMode="auto" r:id="rId13">
               <p14:nvContentPartPr>
                 <p14:cNvPr id="14" name="Ink 13">
@@ -4860,7 +4860,7 @@
               </p14:xfrm>
             </p:contentPart>
           </mc:Choice>
-          <mc:Fallback>
+          <mc:Fallback xmlns="">
             <p:pic>
               <p:nvPicPr>
                 <p:cNvPr id="14" name="Ink 13">
@@ -4891,8 +4891,8 @@
             </p:pic>
           </mc:Fallback>
         </mc:AlternateContent>
-        <mc:AlternateContent xmlns:mc="http://schemas.openxmlformats.org/markup-compatibility/2006">
-          <mc:Choice xmlns:p14="http://schemas.microsoft.com/office/powerpoint/2010/main" Requires="p14">
+        <mc:AlternateContent xmlns:mc="http://schemas.openxmlformats.org/markup-compatibility/2006" xmlns:p14="http://schemas.microsoft.com/office/powerpoint/2010/main">
+          <mc:Choice Requires="p14">
             <p:contentPart p14:bwMode="auto" r:id="rId15">
               <p14:nvContentPartPr>
                 <p14:cNvPr id="16" name="Ink 15">
@@ -4911,7 +4911,7 @@
               </p14:xfrm>
             </p:contentPart>
           </mc:Choice>
-          <mc:Fallback>
+          <mc:Fallback xmlns="">
             <p:pic>
               <p:nvPicPr>
                 <p:cNvPr id="16" name="Ink 15">
@@ -4942,8 +4942,8 @@
             </p:pic>
           </mc:Fallback>
         </mc:AlternateContent>
-        <mc:AlternateContent xmlns:mc="http://schemas.openxmlformats.org/markup-compatibility/2006">
-          <mc:Choice xmlns:p14="http://schemas.microsoft.com/office/powerpoint/2010/main" Requires="p14">
+        <mc:AlternateContent xmlns:mc="http://schemas.openxmlformats.org/markup-compatibility/2006" xmlns:p14="http://schemas.microsoft.com/office/powerpoint/2010/main">
+          <mc:Choice Requires="p14">
             <p:contentPart p14:bwMode="auto" r:id="rId17">
               <p14:nvContentPartPr>
                 <p14:cNvPr id="18" name="Ink 17">
@@ -4962,7 +4962,7 @@
               </p14:xfrm>
             </p:contentPart>
           </mc:Choice>
-          <mc:Fallback>
+          <mc:Fallback xmlns="">
             <p:pic>
               <p:nvPicPr>
                 <p:cNvPr id="18" name="Ink 17">
@@ -5014,8 +5014,8 @@
             <a:chExt cx="243720" cy="178920"/>
           </a:xfrm>
         </p:grpSpPr>
-        <mc:AlternateContent xmlns:mc="http://schemas.openxmlformats.org/markup-compatibility/2006">
-          <mc:Choice xmlns:p14="http://schemas.microsoft.com/office/powerpoint/2010/main" Requires="p14">
+        <mc:AlternateContent xmlns:mc="http://schemas.openxmlformats.org/markup-compatibility/2006" xmlns:p14="http://schemas.microsoft.com/office/powerpoint/2010/main">
+          <mc:Choice Requires="p14">
             <p:contentPart p14:bwMode="auto" r:id="rId19">
               <p14:nvContentPartPr>
                 <p14:cNvPr id="20" name="Ink 19">
@@ -5034,7 +5034,7 @@
               </p14:xfrm>
             </p:contentPart>
           </mc:Choice>
-          <mc:Fallback>
+          <mc:Fallback xmlns="">
             <p:pic>
               <p:nvPicPr>
                 <p:cNvPr id="20" name="Ink 19">
@@ -5065,8 +5065,8 @@
             </p:pic>
           </mc:Fallback>
         </mc:AlternateContent>
-        <mc:AlternateContent xmlns:mc="http://schemas.openxmlformats.org/markup-compatibility/2006">
-          <mc:Choice xmlns:p14="http://schemas.microsoft.com/office/powerpoint/2010/main" Requires="p14">
+        <mc:AlternateContent xmlns:mc="http://schemas.openxmlformats.org/markup-compatibility/2006" xmlns:p14="http://schemas.microsoft.com/office/powerpoint/2010/main">
+          <mc:Choice Requires="p14">
             <p:contentPart p14:bwMode="auto" r:id="rId21">
               <p14:nvContentPartPr>
                 <p14:cNvPr id="21" name="Ink 20">
@@ -5085,7 +5085,7 @@
               </p14:xfrm>
             </p:contentPart>
           </mc:Choice>
-          <mc:Fallback>
+          <mc:Fallback xmlns="">
             <p:pic>
               <p:nvPicPr>
                 <p:cNvPr id="21" name="Ink 20">
@@ -5116,8 +5116,8 @@
             </p:pic>
           </mc:Fallback>
         </mc:AlternateContent>
-        <mc:AlternateContent xmlns:mc="http://schemas.openxmlformats.org/markup-compatibility/2006">
-          <mc:Choice xmlns:p14="http://schemas.microsoft.com/office/powerpoint/2010/main" Requires="p14">
+        <mc:AlternateContent xmlns:mc="http://schemas.openxmlformats.org/markup-compatibility/2006" xmlns:p14="http://schemas.microsoft.com/office/powerpoint/2010/main">
+          <mc:Choice Requires="p14">
             <p:contentPart p14:bwMode="auto" r:id="rId23">
               <p14:nvContentPartPr>
                 <p14:cNvPr id="23" name="Ink 22">
@@ -5136,7 +5136,7 @@
               </p14:xfrm>
             </p:contentPart>
           </mc:Choice>
-          <mc:Fallback>
+          <mc:Fallback xmlns="">
             <p:pic>
               <p:nvPicPr>
                 <p:cNvPr id="23" name="Ink 22">
@@ -5188,8 +5188,8 @@
             <a:chExt cx="284040" cy="150840"/>
           </a:xfrm>
         </p:grpSpPr>
-        <mc:AlternateContent xmlns:mc="http://schemas.openxmlformats.org/markup-compatibility/2006">
-          <mc:Choice xmlns:p14="http://schemas.microsoft.com/office/powerpoint/2010/main" Requires="p14">
+        <mc:AlternateContent xmlns:mc="http://schemas.openxmlformats.org/markup-compatibility/2006" xmlns:p14="http://schemas.microsoft.com/office/powerpoint/2010/main">
+          <mc:Choice Requires="p14">
             <p:contentPart p14:bwMode="auto" r:id="rId24">
               <p14:nvContentPartPr>
                 <p14:cNvPr id="25" name="Ink 24">
@@ -5208,7 +5208,7 @@
               </p14:xfrm>
             </p:contentPart>
           </mc:Choice>
-          <mc:Fallback>
+          <mc:Fallback xmlns="">
             <p:pic>
               <p:nvPicPr>
                 <p:cNvPr id="25" name="Ink 24">
@@ -5239,8 +5239,8 @@
             </p:pic>
           </mc:Fallback>
         </mc:AlternateContent>
-        <mc:AlternateContent xmlns:mc="http://schemas.openxmlformats.org/markup-compatibility/2006">
-          <mc:Choice xmlns:p14="http://schemas.microsoft.com/office/powerpoint/2010/main" Requires="p14">
+        <mc:AlternateContent xmlns:mc="http://schemas.openxmlformats.org/markup-compatibility/2006" xmlns:p14="http://schemas.microsoft.com/office/powerpoint/2010/main">
+          <mc:Choice Requires="p14">
             <p:contentPart p14:bwMode="auto" r:id="rId26">
               <p14:nvContentPartPr>
                 <p14:cNvPr id="26" name="Ink 25">
@@ -5259,7 +5259,7 @@
               </p14:xfrm>
             </p:contentPart>
           </mc:Choice>
-          <mc:Fallback>
+          <mc:Fallback xmlns="">
             <p:pic>
               <p:nvPicPr>
                 <p:cNvPr id="26" name="Ink 25">
@@ -5290,8 +5290,8 @@
             </p:pic>
           </mc:Fallback>
         </mc:AlternateContent>
-        <mc:AlternateContent xmlns:mc="http://schemas.openxmlformats.org/markup-compatibility/2006">
-          <mc:Choice xmlns:p14="http://schemas.microsoft.com/office/powerpoint/2010/main" Requires="p14">
+        <mc:AlternateContent xmlns:mc="http://schemas.openxmlformats.org/markup-compatibility/2006" xmlns:p14="http://schemas.microsoft.com/office/powerpoint/2010/main">
+          <mc:Choice Requires="p14">
             <p:contentPart p14:bwMode="auto" r:id="rId28">
               <p14:nvContentPartPr>
                 <p14:cNvPr id="28" name="Ink 27">
@@ -5310,7 +5310,7 @@
               </p14:xfrm>
             </p:contentPart>
           </mc:Choice>
-          <mc:Fallback>
+          <mc:Fallback xmlns="">
             <p:pic>
               <p:nvPicPr>
                 <p:cNvPr id="28" name="Ink 27">
@@ -5341,8 +5341,8 @@
             </p:pic>
           </mc:Fallback>
         </mc:AlternateContent>
-        <mc:AlternateContent xmlns:mc="http://schemas.openxmlformats.org/markup-compatibility/2006">
-          <mc:Choice xmlns:p14="http://schemas.microsoft.com/office/powerpoint/2010/main" Requires="p14">
+        <mc:AlternateContent xmlns:mc="http://schemas.openxmlformats.org/markup-compatibility/2006" xmlns:p14="http://schemas.microsoft.com/office/powerpoint/2010/main">
+          <mc:Choice Requires="p14">
             <p:contentPart p14:bwMode="auto" r:id="rId30">
               <p14:nvContentPartPr>
                 <p14:cNvPr id="30" name="Ink 29">
@@ -5361,7 +5361,7 @@
               </p14:xfrm>
             </p:contentPart>
           </mc:Choice>
-          <mc:Fallback>
+          <mc:Fallback xmlns="">
             <p:pic>
               <p:nvPicPr>
                 <p:cNvPr id="30" name="Ink 29">
@@ -5393,8 +5393,8 @@
           </mc:Fallback>
         </mc:AlternateContent>
       </p:grpSp>
-      <mc:AlternateContent xmlns:mc="http://schemas.openxmlformats.org/markup-compatibility/2006">
-        <mc:Choice xmlns:p14="http://schemas.microsoft.com/office/powerpoint/2010/main" Requires="p14">
+      <mc:AlternateContent xmlns:mc="http://schemas.openxmlformats.org/markup-compatibility/2006" xmlns:p14="http://schemas.microsoft.com/office/powerpoint/2010/main">
+        <mc:Choice Requires="p14">
           <p:contentPart p14:bwMode="auto" r:id="rId32">
             <p14:nvContentPartPr>
               <p14:cNvPr id="32" name="Ink 31">
@@ -5413,7 +5413,7 @@
             </p14:xfrm>
           </p:contentPart>
         </mc:Choice>
-        <mc:Fallback>
+        <mc:Fallback xmlns="">
           <p:pic>
             <p:nvPicPr>
               <p:cNvPr id="32" name="Ink 31">
@@ -5444,8 +5444,8 @@
           </p:pic>
         </mc:Fallback>
       </mc:AlternateContent>
-      <mc:AlternateContent xmlns:mc="http://schemas.openxmlformats.org/markup-compatibility/2006">
-        <mc:Choice xmlns:p14="http://schemas.microsoft.com/office/powerpoint/2010/main" Requires="p14">
+      <mc:AlternateContent xmlns:mc="http://schemas.openxmlformats.org/markup-compatibility/2006" xmlns:p14="http://schemas.microsoft.com/office/powerpoint/2010/main">
+        <mc:Choice Requires="p14">
           <p:contentPart p14:bwMode="auto" r:id="rId34">
             <p14:nvContentPartPr>
               <p14:cNvPr id="33" name="Ink 32">
@@ -5464,7 +5464,7 @@
             </p14:xfrm>
           </p:contentPart>
         </mc:Choice>
-        <mc:Fallback>
+        <mc:Fallback xmlns="">
           <p:pic>
             <p:nvPicPr>
               <p:cNvPr id="33" name="Ink 32">
@@ -5495,8 +5495,8 @@
           </p:pic>
         </mc:Fallback>
       </mc:AlternateContent>
-      <mc:AlternateContent xmlns:mc="http://schemas.openxmlformats.org/markup-compatibility/2006">
-        <mc:Choice xmlns:p14="http://schemas.microsoft.com/office/powerpoint/2010/main" Requires="p14">
+      <mc:AlternateContent xmlns:mc="http://schemas.openxmlformats.org/markup-compatibility/2006" xmlns:p14="http://schemas.microsoft.com/office/powerpoint/2010/main">
+        <mc:Choice Requires="p14">
           <p:contentPart p14:bwMode="auto" r:id="rId36">
             <p14:nvContentPartPr>
               <p14:cNvPr id="34" name="Ink 33">
@@ -5515,7 +5515,7 @@
             </p14:xfrm>
           </p:contentPart>
         </mc:Choice>
-        <mc:Fallback>
+        <mc:Fallback xmlns="">
           <p:pic>
             <p:nvPicPr>
               <p:cNvPr id="34" name="Ink 33">
@@ -5546,8 +5546,8 @@
           </p:pic>
         </mc:Fallback>
       </mc:AlternateContent>
-      <mc:AlternateContent xmlns:mc="http://schemas.openxmlformats.org/markup-compatibility/2006">
-        <mc:Choice xmlns:p14="http://schemas.microsoft.com/office/powerpoint/2010/main" Requires="p14">
+      <mc:AlternateContent xmlns:mc="http://schemas.openxmlformats.org/markup-compatibility/2006" xmlns:p14="http://schemas.microsoft.com/office/powerpoint/2010/main">
+        <mc:Choice Requires="p14">
           <p:contentPart p14:bwMode="auto" r:id="rId38">
             <p14:nvContentPartPr>
               <p14:cNvPr id="35" name="Ink 34">
@@ -5566,7 +5566,7 @@
             </p14:xfrm>
           </p:contentPart>
         </mc:Choice>
-        <mc:Fallback>
+        <mc:Fallback xmlns="">
           <p:pic>
             <p:nvPicPr>
               <p:cNvPr id="35" name="Ink 34">
@@ -5597,8 +5597,8 @@
           </p:pic>
         </mc:Fallback>
       </mc:AlternateContent>
-      <mc:AlternateContent xmlns:mc="http://schemas.openxmlformats.org/markup-compatibility/2006">
-        <mc:Choice xmlns:p14="http://schemas.microsoft.com/office/powerpoint/2010/main" Requires="p14">
+      <mc:AlternateContent xmlns:mc="http://schemas.openxmlformats.org/markup-compatibility/2006" xmlns:p14="http://schemas.microsoft.com/office/powerpoint/2010/main">
+        <mc:Choice Requires="p14">
           <p:contentPart p14:bwMode="auto" r:id="rId40">
             <p14:nvContentPartPr>
               <p14:cNvPr id="36" name="Ink 35">
@@ -5617,7 +5617,7 @@
             </p14:xfrm>
           </p:contentPart>
         </mc:Choice>
-        <mc:Fallback>
+        <mc:Fallback xmlns="">
           <p:pic>
             <p:nvPicPr>
               <p:cNvPr id="36" name="Ink 35">
@@ -5648,8 +5648,8 @@
           </p:pic>
         </mc:Fallback>
       </mc:AlternateContent>
-      <mc:AlternateContent xmlns:mc="http://schemas.openxmlformats.org/markup-compatibility/2006">
-        <mc:Choice xmlns:p14="http://schemas.microsoft.com/office/powerpoint/2010/main" Requires="p14">
+      <mc:AlternateContent xmlns:mc="http://schemas.openxmlformats.org/markup-compatibility/2006" xmlns:p14="http://schemas.microsoft.com/office/powerpoint/2010/main">
+        <mc:Choice Requires="p14">
           <p:contentPart p14:bwMode="auto" r:id="rId42">
             <p14:nvContentPartPr>
               <p14:cNvPr id="37" name="Ink 36">
@@ -5668,7 +5668,7 @@
             </p14:xfrm>
           </p:contentPart>
         </mc:Choice>
-        <mc:Fallback>
+        <mc:Fallback xmlns="">
           <p:pic>
             <p:nvPicPr>
               <p:cNvPr id="37" name="Ink 36">
@@ -7098,7 +7098,16 @@
               <a:rPr lang="en-US" sz="2000" dirty="0">
                 <a:latin typeface="Söhne"/>
               </a:rPr>
-              <a:t>List tokens in the wallet</a:t>
+              <a:t>Show tokens in the wallet</a:t>
+            </a:r>
+          </a:p>
+          <a:p>
+            <a:pPr lvl="1"/>
+            <a:r>
+              <a:rPr lang="en-US" sz="2000" dirty="0">
+                <a:latin typeface="Söhne"/>
+              </a:rPr>
+              <a:t>Borrow cryptocurrency</a:t>
             </a:r>
           </a:p>
           <a:p>
@@ -7108,15 +7117,6 @@
                 <a:latin typeface="Söhne"/>
               </a:rPr>
               <a:t>List current loans</a:t>
-            </a:r>
-          </a:p>
-          <a:p>
-            <a:pPr lvl="1"/>
-            <a:r>
-              <a:rPr lang="en-US" sz="2000" dirty="0">
-                <a:latin typeface="Söhne"/>
-              </a:rPr>
-              <a:t>Borrow crypto</a:t>
             </a:r>
           </a:p>
           <a:p>
@@ -7148,8 +7148,8 @@
         </p:nvSpPr>
         <p:spPr>
           <a:xfrm>
-            <a:off x="6633756" y="3354265"/>
-            <a:ext cx="5181600" cy="2134264"/>
+            <a:off x="6633756" y="3354264"/>
+            <a:ext cx="5181600" cy="3002085"/>
           </a:xfrm>
         </p:spPr>
         <p:txBody>
@@ -7162,19 +7162,19 @@
               <a:buNone/>
             </a:pPr>
             <a:r>
-              <a:rPr lang="en-US" b="1" i="0" dirty="0">
-                <a:effectLst/>
-                <a:latin typeface="Söhne"/>
-              </a:rPr>
-              <a:t>Backend + </a:t>
-            </a:r>
-            <a:r>
               <a:rPr lang="en-US" b="1" i="0" dirty="0" err="1">
                 <a:effectLst/>
                 <a:latin typeface="Söhne"/>
               </a:rPr>
               <a:t>Infura</a:t>
             </a:r>
+            <a:r>
+              <a:rPr lang="en-US" b="1" i="0" dirty="0">
+                <a:effectLst/>
+                <a:latin typeface="Söhne"/>
+              </a:rPr>
+              <a:t> + Linea</a:t>
+            </a:r>
             <a:endParaRPr lang="en-US" b="1" dirty="0">
               <a:latin typeface="Söhne"/>
             </a:endParaRPr>
@@ -7188,16 +7188,45 @@
                 <a:effectLst/>
                 <a:latin typeface="Söhne"/>
               </a:rPr>
-              <a:t>To connect the user interface with Ethereum blockchain for transaction processing and event monitoring:</a:t>
-            </a:r>
-          </a:p>
-          <a:p>
-            <a:pPr lvl="1"/>
+              <a:t>To connect the user interface with a </a:t>
+            </a:r>
             <a:r>
               <a:rPr lang="en-US" sz="2000" dirty="0">
                 <a:latin typeface="Söhne"/>
               </a:rPr>
-              <a:t>Store loan transactions data</a:t>
+              <a:t>smart contract in </a:t>
+            </a:r>
+            <a:r>
+              <a:rPr lang="en-US" sz="2000" b="0" i="0" dirty="0">
+                <a:effectLst/>
+                <a:latin typeface="Söhne"/>
+              </a:rPr>
+              <a:t>Linea Blockchain:</a:t>
+            </a:r>
+          </a:p>
+          <a:p>
+            <a:pPr lvl="1"/>
+            <a:r>
+              <a:rPr lang="en-US" sz="2000" dirty="0">
+                <a:latin typeface="Söhne"/>
+              </a:rPr>
+              <a:t>T</a:t>
+            </a:r>
+            <a:r>
+              <a:rPr lang="en-US" sz="2000" b="0" i="0" dirty="0">
+                <a:effectLst/>
+                <a:latin typeface="Söhne"/>
+              </a:rPr>
+              <a:t>ransaction processing and storage</a:t>
+            </a:r>
+          </a:p>
+          <a:p>
+            <a:pPr lvl="1"/>
+            <a:r>
+              <a:rPr lang="en-US" sz="2000" dirty="0">
+                <a:latin typeface="Söhne"/>
+              </a:rPr>
+              <a:t>List user’s token</a:t>
             </a:r>
           </a:p>
           <a:p>
@@ -7279,7 +7308,7 @@
         </p:blipFill>
         <p:spPr bwMode="auto">
           <a:xfrm>
-            <a:off x="8646698" y="1895829"/>
+            <a:off x="7462649" y="1944618"/>
             <a:ext cx="1155716" cy="1155716"/>
           </a:xfrm>
           <a:prstGeom prst="rect">
@@ -7362,6 +7391,60 @@
           <a:xfrm>
             <a:off x="2403938" y="1859694"/>
             <a:ext cx="1352881" cy="1325563"/>
+          </a:xfrm>
+          <a:prstGeom prst="rect">
+            <a:avLst/>
+          </a:prstGeom>
+          <a:noFill/>
+          <a:effectLst>
+            <a:outerShdw blurRad="50800" dist="127000" dir="2700000" algn="tl" rotWithShape="0">
+              <a:prstClr val="black">
+                <a:alpha val="40000"/>
+              </a:prstClr>
+            </a:outerShdw>
+          </a:effectLst>
+          <a:extLst>
+            <a:ext uri="{909E8E84-426E-40DD-AFC4-6F175D3DCCD1}">
+              <a14:hiddenFill xmlns:a14="http://schemas.microsoft.com/office/drawing/2010/main">
+                <a:solidFill>
+                  <a:srgbClr val="FFFFFF"/>
+                </a:solidFill>
+              </a14:hiddenFill>
+            </a:ext>
+          </a:extLst>
+        </p:spPr>
+      </p:pic>
+      <p:pic>
+        <p:nvPicPr>
+          <p:cNvPr id="1026" name="Picture 2" descr="See LIVE FROM PARIS: LINEA MAINNET at Consensys Events Global Events">
+            <a:extLst>
+              <a:ext uri="{FF2B5EF4-FFF2-40B4-BE49-F238E27FC236}">
+                <a16:creationId xmlns:a16="http://schemas.microsoft.com/office/drawing/2014/main" id="{CF5155E7-9013-EA28-76BF-B5C0380717AB}"/>
+              </a:ext>
+            </a:extLst>
+          </p:cNvPr>
+          <p:cNvPicPr>
+            <a:picLocks noChangeAspect="1" noChangeArrowheads="1"/>
+          </p:cNvPicPr>
+          <p:nvPr/>
+        </p:nvPicPr>
+        <p:blipFill>
+          <a:blip r:embed="rId4">
+            <a:extLst>
+              <a:ext uri="{28A0092B-C50C-407E-A947-70E740481C1C}">
+                <a14:useLocalDpi xmlns:a14="http://schemas.microsoft.com/office/drawing/2010/main" val="0"/>
+              </a:ext>
+            </a:extLst>
+          </a:blip>
+          <a:srcRect/>
+          <a:stretch>
+            <a:fillRect/>
+          </a:stretch>
+        </p:blipFill>
+        <p:spPr bwMode="auto">
+          <a:xfrm>
+            <a:off x="9649577" y="1944618"/>
+            <a:ext cx="1155716" cy="1155716"/>
           </a:xfrm>
           <a:prstGeom prst="rect">
             <a:avLst/>

</xml_diff>